<commit_message>
refactored error pages and some more
</commit_message>
<xml_diff>
--- a/JCasino presentation.pptx
+++ b/JCasino presentation.pptx
@@ -339,7 +339,7 @@
           <a:p>
             <a:fld id="{B4C71EC6-210F-42DE-9C53-41977AD35B3D}" type="datetimeFigureOut">
               <a:rPr lang="ru-RU" smtClean="0"/>
-              <a:t>24.05.2017</a:t>
+              <a:t>30.05.2017</a:t>
             </a:fld>
             <a:endParaRPr lang="ru-RU"/>
           </a:p>
@@ -504,7 +504,7 @@
           <a:p>
             <a:fld id="{B4C71EC6-210F-42DE-9C53-41977AD35B3D}" type="datetimeFigureOut">
               <a:rPr lang="ru-RU" smtClean="0"/>
-              <a:t>24.05.2017</a:t>
+              <a:t>30.05.2017</a:t>
             </a:fld>
             <a:endParaRPr lang="ru-RU"/>
           </a:p>
@@ -679,7 +679,7 @@
           <a:p>
             <a:fld id="{B4C71EC6-210F-42DE-9C53-41977AD35B3D}" type="datetimeFigureOut">
               <a:rPr lang="ru-RU" smtClean="0"/>
-              <a:t>24.05.2017</a:t>
+              <a:t>30.05.2017</a:t>
             </a:fld>
             <a:endParaRPr lang="ru-RU"/>
           </a:p>
@@ -844,7 +844,7 @@
           <a:p>
             <a:fld id="{B4C71EC6-210F-42DE-9C53-41977AD35B3D}" type="datetimeFigureOut">
               <a:rPr lang="ru-RU" smtClean="0"/>
-              <a:t>24.05.2017</a:t>
+              <a:t>30.05.2017</a:t>
             </a:fld>
             <a:endParaRPr lang="ru-RU"/>
           </a:p>
@@ -1085,7 +1085,7 @@
           <a:p>
             <a:fld id="{B4C71EC6-210F-42DE-9C53-41977AD35B3D}" type="datetimeFigureOut">
               <a:rPr lang="ru-RU" smtClean="0"/>
-              <a:t>24.05.2017</a:t>
+              <a:t>30.05.2017</a:t>
             </a:fld>
             <a:endParaRPr lang="ru-RU"/>
           </a:p>
@@ -1368,7 +1368,7 @@
           <a:p>
             <a:fld id="{B4C71EC6-210F-42DE-9C53-41977AD35B3D}" type="datetimeFigureOut">
               <a:rPr lang="ru-RU" smtClean="0"/>
-              <a:t>24.05.2017</a:t>
+              <a:t>30.05.2017</a:t>
             </a:fld>
             <a:endParaRPr lang="ru-RU"/>
           </a:p>
@@ -1785,7 +1785,7 @@
           <a:p>
             <a:fld id="{B4C71EC6-210F-42DE-9C53-41977AD35B3D}" type="datetimeFigureOut">
               <a:rPr lang="ru-RU" smtClean="0"/>
-              <a:t>24.05.2017</a:t>
+              <a:t>30.05.2017</a:t>
             </a:fld>
             <a:endParaRPr lang="ru-RU"/>
           </a:p>
@@ -1898,7 +1898,7 @@
           <a:p>
             <a:fld id="{B4C71EC6-210F-42DE-9C53-41977AD35B3D}" type="datetimeFigureOut">
               <a:rPr lang="ru-RU" smtClean="0"/>
-              <a:t>24.05.2017</a:t>
+              <a:t>30.05.2017</a:t>
             </a:fld>
             <a:endParaRPr lang="ru-RU"/>
           </a:p>
@@ -1988,7 +1988,7 @@
           <a:p>
             <a:fld id="{B4C71EC6-210F-42DE-9C53-41977AD35B3D}" type="datetimeFigureOut">
               <a:rPr lang="ru-RU" smtClean="0"/>
-              <a:t>24.05.2017</a:t>
+              <a:t>30.05.2017</a:t>
             </a:fld>
             <a:endParaRPr lang="ru-RU"/>
           </a:p>
@@ -2260,7 +2260,7 @@
           <a:p>
             <a:fld id="{B4C71EC6-210F-42DE-9C53-41977AD35B3D}" type="datetimeFigureOut">
               <a:rPr lang="ru-RU" smtClean="0"/>
-              <a:t>24.05.2017</a:t>
+              <a:t>30.05.2017</a:t>
             </a:fld>
             <a:endParaRPr lang="ru-RU"/>
           </a:p>
@@ -2508,7 +2508,7 @@
           <a:p>
             <a:fld id="{B4C71EC6-210F-42DE-9C53-41977AD35B3D}" type="datetimeFigureOut">
               <a:rPr lang="ru-RU" smtClean="0"/>
-              <a:t>24.05.2017</a:t>
+              <a:t>30.05.2017</a:t>
             </a:fld>
             <a:endParaRPr lang="ru-RU"/>
           </a:p>
@@ -2731,7 +2731,7 @@
           <a:p>
             <a:fld id="{B4C71EC6-210F-42DE-9C53-41977AD35B3D}" type="datetimeFigureOut">
               <a:rPr lang="ru-RU" smtClean="0"/>
-              <a:t>24.05.2017</a:t>
+              <a:t>30.05.2017</a:t>
             </a:fld>
             <a:endParaRPr lang="ru-RU"/>
           </a:p>
@@ -3705,7 +3705,7 @@
         <p:spPr>
           <a:xfrm>
             <a:off x="0" y="3177988"/>
-            <a:ext cx="1528997" cy="1204825"/>
+            <a:ext cx="2301766" cy="1204825"/>
           </a:xfrm>
           <a:prstGeom prst="rect">
             <a:avLst/>
@@ -3737,7 +3737,23 @@
                 <a:latin typeface="Arial" pitchFamily="34" charset="0"/>
                 <a:cs typeface="Arial" pitchFamily="34" charset="0"/>
               </a:rPr>
-              <a:t>Client (Web Browser)</a:t>
+              <a:t>Client</a:t>
+            </a:r>
+          </a:p>
+          <a:p>
+            <a:r>
+              <a:rPr lang="en-US" sz="2400" dirty="0" smtClean="0">
+                <a:latin typeface="Arial" pitchFamily="34" charset="0"/>
+                <a:cs typeface="Arial" pitchFamily="34" charset="0"/>
+              </a:rPr>
+              <a:t>(Web </a:t>
+            </a:r>
+            <a:r>
+              <a:rPr lang="en-US" sz="2400" dirty="0" smtClean="0">
+                <a:latin typeface="Arial" pitchFamily="34" charset="0"/>
+                <a:cs typeface="Arial" pitchFamily="34" charset="0"/>
+              </a:rPr>
+              <a:t>Browser)</a:t>
             </a:r>
           </a:p>
         </p:txBody>
@@ -4344,21 +4360,42 @@
                 <a:latin typeface="Arial" pitchFamily="34" charset="0"/>
                 <a:cs typeface="Arial" pitchFamily="34" charset="0"/>
               </a:rPr>
-              <a:t>Pure HTML5, CSSS3, JavaScript, </a:t>
-            </a:r>
-            <a:r>
-              <a:rPr lang="en-US" sz="2400" dirty="0" err="1" smtClean="0">
-                <a:latin typeface="Arial" pitchFamily="34" charset="0"/>
-                <a:cs typeface="Arial" pitchFamily="34" charset="0"/>
-              </a:rPr>
-              <a:t>Flexbox</a:t>
-            </a:r>
-            <a:r>
-              <a:rPr lang="en-US" sz="2400" dirty="0" smtClean="0">
-                <a:latin typeface="Arial" pitchFamily="34" charset="0"/>
-                <a:cs typeface="Arial" pitchFamily="34" charset="0"/>
-              </a:rPr>
-              <a:t> responsive design;</a:t>
+              <a:t>Pure HTML5, </a:t>
+            </a:r>
+            <a:r>
+              <a:rPr lang="en-US" sz="2400" dirty="0" smtClean="0">
+                <a:latin typeface="Arial" pitchFamily="34" charset="0"/>
+                <a:cs typeface="Arial" pitchFamily="34" charset="0"/>
+              </a:rPr>
+              <a:t>CSSS3, </a:t>
+            </a:r>
+            <a:r>
+              <a:rPr lang="en-US" sz="2400" dirty="0" smtClean="0">
+                <a:latin typeface="Arial" pitchFamily="34" charset="0"/>
+                <a:cs typeface="Arial" pitchFamily="34" charset="0"/>
+              </a:rPr>
+              <a:t>JavaScript</a:t>
+            </a:r>
+            <a:r>
+              <a:rPr lang="en-US" sz="2400" dirty="0" smtClean="0">
+                <a:latin typeface="Arial" pitchFamily="34" charset="0"/>
+                <a:cs typeface="Arial" pitchFamily="34" charset="0"/>
+              </a:rPr>
+              <a:t>, </a:t>
+            </a:r>
+            <a:r>
+              <a:rPr lang="en-US" sz="2400" dirty="0" smtClean="0">
+                <a:latin typeface="Arial" pitchFamily="34" charset="0"/>
+                <a:cs typeface="Arial" pitchFamily="34" charset="0"/>
+              </a:rPr>
+              <a:t>responsive </a:t>
+            </a:r>
+            <a:r>
+              <a:rPr lang="en-US" sz="2400" dirty="0" smtClean="0">
+                <a:latin typeface="Arial" pitchFamily="34" charset="0"/>
+                <a:cs typeface="Arial" pitchFamily="34" charset="0"/>
+              </a:rPr>
+              <a:t>design;</a:t>
             </a:r>
           </a:p>
           <a:p>
@@ -4378,8 +4415,12 @@
                 <a:latin typeface="Arial" pitchFamily="34" charset="0"/>
                 <a:cs typeface="Arial" pitchFamily="34" charset="0"/>
               </a:rPr>
-              <a:t> plugins;</a:t>
-            </a:r>
+              <a:t>;</a:t>
+            </a:r>
+            <a:endParaRPr lang="en-US" sz="2400" dirty="0" smtClean="0">
+              <a:latin typeface="Arial" pitchFamily="34" charset="0"/>
+              <a:cs typeface="Arial" pitchFamily="34" charset="0"/>
+            </a:endParaRPr>
           </a:p>
           <a:p>
             <a:pPr marL="900113" indent="-360363" algn="l">
@@ -4398,8 +4439,33 @@
                 <a:latin typeface="Arial" pitchFamily="34" charset="0"/>
                 <a:cs typeface="Arial" pitchFamily="34" charset="0"/>
               </a:rPr>
-              <a:t> pagination and some other small JS libraries;</a:t>
-            </a:r>
+              <a:t> pagination and </a:t>
+            </a:r>
+            <a:r>
+              <a:rPr lang="en-US" sz="2400" dirty="0" smtClean="0">
+                <a:latin typeface="Arial" pitchFamily="34" charset="0"/>
+                <a:cs typeface="Arial" pitchFamily="34" charset="0"/>
+              </a:rPr>
+              <a:t>other libraries and </a:t>
+            </a:r>
+            <a:r>
+              <a:rPr lang="en-US" sz="2400" dirty="0" err="1" smtClean="0">
+                <a:latin typeface="Arial" pitchFamily="34" charset="0"/>
+                <a:cs typeface="Arial" pitchFamily="34" charset="0"/>
+              </a:rPr>
+              <a:t>jQuery</a:t>
+            </a:r>
+            <a:r>
+              <a:rPr lang="en-US" sz="2400" dirty="0" smtClean="0">
+                <a:latin typeface="Arial" pitchFamily="34" charset="0"/>
+                <a:cs typeface="Arial" pitchFamily="34" charset="0"/>
+              </a:rPr>
+              <a:t> plugins;</a:t>
+            </a:r>
+            <a:endParaRPr lang="en-US" sz="2400" dirty="0" smtClean="0">
+              <a:latin typeface="Arial" pitchFamily="34" charset="0"/>
+              <a:cs typeface="Arial" pitchFamily="34" charset="0"/>
+            </a:endParaRPr>
           </a:p>
           <a:p>
             <a:pPr marL="900113" indent="-360363" algn="l">
@@ -4411,8 +4477,19 @@
                 <a:latin typeface="Arial" pitchFamily="34" charset="0"/>
                 <a:cs typeface="Arial" pitchFamily="34" charset="0"/>
               </a:rPr>
-              <a:t>Game engine using AJAX, Canvas animation, JS;</a:t>
-            </a:r>
+              <a:t>Game engine using AJAX, Canvas animation</a:t>
+            </a:r>
+            <a:r>
+              <a:rPr lang="en-US" sz="2400" dirty="0" smtClean="0">
+                <a:latin typeface="Arial" pitchFamily="34" charset="0"/>
+                <a:cs typeface="Arial" pitchFamily="34" charset="0"/>
+              </a:rPr>
+              <a:t>, JS;</a:t>
+            </a:r>
+            <a:endParaRPr lang="en-US" sz="2400" dirty="0" smtClean="0">
+              <a:latin typeface="Arial" pitchFamily="34" charset="0"/>
+              <a:cs typeface="Arial" pitchFamily="34" charset="0"/>
+            </a:endParaRPr>
           </a:p>
           <a:p>
             <a:pPr marL="900113" indent="-360363" algn="l">
@@ -4459,7 +4536,7 @@
         </p:blipFill>
         <p:spPr bwMode="auto">
           <a:xfrm>
-            <a:off x="1425245" y="3859965"/>
+            <a:off x="1425245" y="3607709"/>
             <a:ext cx="6387115" cy="2998034"/>
           </a:xfrm>
           <a:prstGeom prst="rect">
@@ -4729,7 +4806,7 @@
         </p:blipFill>
         <p:spPr bwMode="auto">
           <a:xfrm>
-            <a:off x="5069168" y="3980422"/>
+            <a:off x="5861706" y="3539275"/>
             <a:ext cx="2569779" cy="1836322"/>
           </a:xfrm>
           <a:prstGeom prst="rect">
@@ -4779,7 +4856,7 @@
         </p:blipFill>
         <p:spPr bwMode="auto">
           <a:xfrm>
-            <a:off x="865031" y="4279458"/>
+            <a:off x="1123950" y="4756472"/>
             <a:ext cx="3448050" cy="1238250"/>
           </a:xfrm>
           <a:prstGeom prst="rect">
@@ -5709,7 +5786,28 @@
                 <a:latin typeface="Arial" pitchFamily="34" charset="0"/>
                 <a:cs typeface="Arial" pitchFamily="34" charset="0"/>
               </a:rPr>
-              <a:t>Execute command to  take navigation data</a:t>
+              <a:t>Execute defined </a:t>
+            </a:r>
+            <a:r>
+              <a:rPr lang="en-US" sz="1800" i="1" dirty="0" smtClean="0">
+                <a:latin typeface="Arial" pitchFamily="34" charset="0"/>
+                <a:cs typeface="Arial" pitchFamily="34" charset="0"/>
+              </a:rPr>
+              <a:t>command </a:t>
+            </a:r>
+            <a:r>
+              <a:rPr lang="en-US" sz="1800" i="1" dirty="0" smtClean="0">
+                <a:latin typeface="Arial" pitchFamily="34" charset="0"/>
+                <a:cs typeface="Arial" pitchFamily="34" charset="0"/>
+              </a:rPr>
+              <a:t>to take </a:t>
+            </a:r>
+            <a:r>
+              <a:rPr lang="en-US" sz="1800" i="1" dirty="0" smtClean="0">
+                <a:latin typeface="Arial" pitchFamily="34" charset="0"/>
+                <a:cs typeface="Arial" pitchFamily="34" charset="0"/>
+              </a:rPr>
+              <a:t>navigation data</a:t>
             </a:r>
           </a:p>
         </p:txBody>
@@ -6001,8 +6099,8 @@
         </p:nvSpPr>
         <p:spPr>
           <a:xfrm>
-            <a:off x="2886594" y="975333"/>
-            <a:ext cx="3237995" cy="442838"/>
+            <a:off x="2606540" y="975333"/>
+            <a:ext cx="4121307" cy="442838"/>
           </a:xfrm>
           <a:prstGeom prst="rect">
             <a:avLst/>
@@ -6034,7 +6132,14 @@
                 <a:latin typeface="Arial" pitchFamily="34" charset="0"/>
                 <a:cs typeface="Arial" pitchFamily="34" charset="0"/>
               </a:rPr>
-              <a:t>Application Server</a:t>
+              <a:t>Tomcat Application </a:t>
+            </a:r>
+            <a:r>
+              <a:rPr lang="en-US" sz="2400" dirty="0" smtClean="0">
+                <a:latin typeface="Arial" pitchFamily="34" charset="0"/>
+                <a:cs typeface="Arial" pitchFamily="34" charset="0"/>
+              </a:rPr>
+              <a:t>Server</a:t>
             </a:r>
           </a:p>
         </p:txBody>
@@ -6392,15 +6497,13 @@
       <p:cxnSp>
         <p:nvCxnSpPr>
           <p:cNvPr id="84" name="Прямая со стрелкой 83"/>
-          <p:cNvCxnSpPr>
-            <a:endCxn id="37" idx="3"/>
-          </p:cNvCxnSpPr>
+          <p:cNvCxnSpPr/>
           <p:nvPr/>
         </p:nvCxnSpPr>
         <p:spPr>
           <a:xfrm flipH="1">
-            <a:off x="2711664" y="3468414"/>
-            <a:ext cx="2330706" cy="666327"/>
+            <a:off x="883861" y="3468414"/>
+            <a:ext cx="4158509" cy="1671145"/>
           </a:xfrm>
           <a:prstGeom prst="straightConnector1">
             <a:avLst/>
@@ -6433,15 +6536,14 @@
         <p:nvCxnSpPr>
           <p:cNvPr id="87" name="Прямая со стрелкой 86"/>
           <p:cNvCxnSpPr>
-            <a:stCxn id="37" idx="3"/>
             <a:endCxn id="4118" idx="1"/>
           </p:cNvCxnSpPr>
           <p:nvPr/>
         </p:nvCxnSpPr>
         <p:spPr>
-          <a:xfrm>
-            <a:off x="2711664" y="4134741"/>
-            <a:ext cx="2221081" cy="516545"/>
+          <a:xfrm flipV="1">
+            <a:off x="883861" y="4651286"/>
+            <a:ext cx="4048884" cy="488274"/>
           </a:xfrm>
           <a:prstGeom prst="straightConnector1">
             <a:avLst/>
@@ -6479,8 +6581,8 @@
           <p:nvPr/>
         </p:nvSpPr>
         <p:spPr>
-          <a:xfrm rot="20676039">
-            <a:off x="2805033" y="3357922"/>
+          <a:xfrm rot="20230782">
+            <a:off x="2805032" y="3518624"/>
             <a:ext cx="2007137" cy="380865"/>
           </a:xfrm>
           <a:prstGeom prst="rect">
@@ -6527,8 +6629,8 @@
           <p:nvPr/>
         </p:nvSpPr>
         <p:spPr>
-          <a:xfrm rot="814671">
-            <a:off x="2805034" y="4429446"/>
+          <a:xfrm rot="21149098">
+            <a:off x="2827540" y="4403428"/>
             <a:ext cx="2007137" cy="380865"/>
           </a:xfrm>
           <a:prstGeom prst="rect">
@@ -7014,7 +7116,14 @@
                 <a:latin typeface="Arial" pitchFamily="34" charset="0"/>
                 <a:cs typeface="Arial" pitchFamily="34" charset="0"/>
               </a:rPr>
-              <a:t>Third-party Java libraries;</a:t>
+              <a:t>Third-party Java </a:t>
+            </a:r>
+            <a:r>
+              <a:rPr lang="en-US" sz="2400" dirty="0" smtClean="0">
+                <a:latin typeface="Arial" pitchFamily="34" charset="0"/>
+                <a:cs typeface="Arial" pitchFamily="34" charset="0"/>
+              </a:rPr>
+              <a:t>libraries;</a:t>
             </a:r>
           </a:p>
           <a:p>
@@ -7027,7 +7136,21 @@
                 <a:latin typeface="Arial" pitchFamily="34" charset="0"/>
                 <a:cs typeface="Arial" pitchFamily="34" charset="0"/>
               </a:rPr>
-              <a:t>Request parameters validation.</a:t>
+              <a:t>Request </a:t>
+            </a:r>
+            <a:r>
+              <a:rPr lang="en-US" sz="2400" dirty="0" smtClean="0">
+                <a:latin typeface="Arial" pitchFamily="34" charset="0"/>
+                <a:cs typeface="Arial" pitchFamily="34" charset="0"/>
+              </a:rPr>
+              <a:t>data validation</a:t>
+            </a:r>
+            <a:r>
+              <a:rPr lang="en-US" sz="2400" dirty="0" smtClean="0">
+                <a:latin typeface="Arial" pitchFamily="34" charset="0"/>
+                <a:cs typeface="Arial" pitchFamily="34" charset="0"/>
+              </a:rPr>
+              <a:t>.</a:t>
             </a:r>
           </a:p>
           <a:p>
@@ -7356,7 +7479,14 @@
                 <a:latin typeface="Arial" pitchFamily="34" charset="0"/>
                 <a:cs typeface="Arial" pitchFamily="34" charset="0"/>
               </a:rPr>
-              <a:t>Local and remote deployment setup (</a:t>
+              <a:t>Local and remote deployment </a:t>
+            </a:r>
+            <a:r>
+              <a:rPr lang="en-US" sz="2400" dirty="0" smtClean="0">
+                <a:latin typeface="Arial" pitchFamily="34" charset="0"/>
+                <a:cs typeface="Arial" pitchFamily="34" charset="0"/>
+              </a:rPr>
+              <a:t>settings (</a:t>
             </a:r>
             <a:r>
               <a:rPr lang="en-US" sz="2400" dirty="0" err="1" smtClean="0">
@@ -7370,14 +7500,14 @@
                 <a:latin typeface="Arial" pitchFamily="34" charset="0"/>
                 <a:cs typeface="Arial" pitchFamily="34" charset="0"/>
               </a:rPr>
-              <a:t> platform</a:t>
-            </a:r>
-            <a:r>
-              <a:rPr lang="en-US" sz="2400" dirty="0" smtClean="0">
-                <a:latin typeface="Arial" pitchFamily="34" charset="0"/>
-                <a:cs typeface="Arial" pitchFamily="34" charset="0"/>
-              </a:rPr>
-              <a:t>);</a:t>
+              <a:t> </a:t>
+            </a:r>
+            <a:r>
+              <a:rPr lang="en-US" sz="2400" dirty="0" smtClean="0">
+                <a:latin typeface="Arial" pitchFamily="34" charset="0"/>
+                <a:cs typeface="Arial" pitchFamily="34" charset="0"/>
+              </a:rPr>
+              <a:t>platform);</a:t>
             </a:r>
           </a:p>
           <a:p>
@@ -7419,10 +7549,6 @@
               </a:rPr>
               <a:t>;</a:t>
             </a:r>
-            <a:endParaRPr lang="en-US" sz="2400" dirty="0" smtClean="0">
-              <a:latin typeface="Arial" pitchFamily="34" charset="0"/>
-              <a:cs typeface="Arial" pitchFamily="34" charset="0"/>
-            </a:endParaRPr>
           </a:p>
           <a:p>
             <a:pPr marL="900113" indent="-360363" algn="l">
@@ -7692,14 +7818,7 @@
                 <a:latin typeface="Arial" pitchFamily="34" charset="0"/>
                 <a:cs typeface="Arial" pitchFamily="34" charset="0"/>
               </a:rPr>
-              <a:t>Test</a:t>
-            </a:r>
-            <a:r>
-              <a:rPr lang="en-US" sz="2400" u="sng" dirty="0" smtClean="0">
-                <a:latin typeface="Arial" pitchFamily="34" charset="0"/>
-                <a:cs typeface="Arial" pitchFamily="34" charset="0"/>
-              </a:rPr>
-              <a:t>:</a:t>
+              <a:t>Test:</a:t>
             </a:r>
             <a:endParaRPr lang="en-US" sz="2400" dirty="0" smtClean="0">
               <a:latin typeface="Arial" pitchFamily="34" charset="0"/>
@@ -7725,10 +7844,6 @@
               </a:rPr>
               <a:t> 4;</a:t>
             </a:r>
-            <a:endParaRPr lang="en-US" sz="2400" dirty="0" smtClean="0">
-              <a:latin typeface="Arial" pitchFamily="34" charset="0"/>
-              <a:cs typeface="Arial" pitchFamily="34" charset="0"/>
-            </a:endParaRPr>
           </a:p>
           <a:p>
             <a:pPr marL="900113" indent="-360363" algn="l">
@@ -7787,10 +7902,6 @@
               </a:rPr>
               <a:t>;</a:t>
             </a:r>
-            <a:endParaRPr lang="en-US" sz="2400" dirty="0" smtClean="0">
-              <a:latin typeface="Arial" pitchFamily="34" charset="0"/>
-              <a:cs typeface="Arial" pitchFamily="34" charset="0"/>
-            </a:endParaRPr>
           </a:p>
           <a:p>
             <a:pPr marL="900113" indent="-360363" algn="l">
@@ -7804,10 +7915,6 @@
               </a:rPr>
               <a:t>Code coverage tools.</a:t>
             </a:r>
-            <a:endParaRPr lang="en-US" sz="2400" dirty="0" smtClean="0">
-              <a:latin typeface="Arial" pitchFamily="34" charset="0"/>
-              <a:cs typeface="Arial" pitchFamily="34" charset="0"/>
-            </a:endParaRPr>
           </a:p>
           <a:p>
             <a:pPr marL="900113" indent="-360363" algn="l">
@@ -7844,7 +7951,7 @@
         </p:blipFill>
         <p:spPr bwMode="auto">
           <a:xfrm>
-            <a:off x="137189" y="3047999"/>
+            <a:off x="762000" y="3363310"/>
             <a:ext cx="3810000" cy="3810000"/>
           </a:xfrm>
           <a:prstGeom prst="rect">
@@ -7885,7 +7992,7 @@
         </p:blipFill>
         <p:spPr bwMode="auto">
           <a:xfrm>
-            <a:off x="3873072" y="3560379"/>
+            <a:off x="3573518" y="2167758"/>
             <a:ext cx="5570482" cy="2785241"/>
           </a:xfrm>
           <a:prstGeom prst="rect">
@@ -8019,27 +8126,27 @@
       </p:pic>
       <p:pic>
         <p:nvPicPr>
-          <p:cNvPr id="2050" name="Picture 2" descr="C:\Users\User\Desktop\Преза проекта\coco1.png"/>
+          <p:cNvPr id="2050" name="Picture 2"/>
           <p:cNvPicPr>
             <a:picLocks noChangeAspect="1" noChangeArrowheads="1"/>
           </p:cNvPicPr>
           <p:nvPr/>
         </p:nvPicPr>
         <p:blipFill rotWithShape="1">
-          <a:blip r:embed="rId3" cstate="print">
+          <a:blip r:embed="rId3">
             <a:extLst>
               <a:ext uri="{28A0092B-C50C-407E-A947-70E740481C1C}">
                 <a14:useLocalDpi xmlns:a14="http://schemas.microsoft.com/office/drawing/2010/main" val="0"/>
               </a:ext>
             </a:extLst>
           </a:blip>
-          <a:srcRect/>
+          <a:srcRect t="1863"/>
           <a:stretch/>
         </p:blipFill>
         <p:spPr bwMode="auto">
           <a:xfrm>
-            <a:off x="0" y="2254490"/>
-            <a:ext cx="9144000" cy="3042724"/>
+            <a:off x="0" y="1531088"/>
+            <a:ext cx="9144000" cy="3951168"/>
           </a:xfrm>
           <a:prstGeom prst="rect">
             <a:avLst/>
@@ -8058,68 +8165,27 @@
       </p:pic>
       <p:pic>
         <p:nvPicPr>
-          <p:cNvPr id="2051" name="Picture 3" descr="C:\Users\User\Desktop\Преза проекта\coco2.png"/>
+          <p:cNvPr id="2052" name="Picture 4"/>
           <p:cNvPicPr>
             <a:picLocks noChangeAspect="1" noChangeArrowheads="1"/>
           </p:cNvPicPr>
           <p:nvPr/>
         </p:nvPicPr>
         <p:blipFill rotWithShape="1">
-          <a:blip r:embed="rId4" cstate="print">
+          <a:blip r:embed="rId4">
             <a:extLst>
               <a:ext uri="{28A0092B-C50C-407E-A947-70E740481C1C}">
                 <a14:useLocalDpi xmlns:a14="http://schemas.microsoft.com/office/drawing/2010/main" val="0"/>
               </a:ext>
             </a:extLst>
           </a:blip>
-          <a:srcRect/>
+          <a:srcRect t="40580" r="7237"/>
           <a:stretch/>
         </p:blipFill>
         <p:spPr bwMode="auto">
           <a:xfrm>
-            <a:off x="0" y="1196752"/>
-            <a:ext cx="9144000" cy="884296"/>
-          </a:xfrm>
-          <a:prstGeom prst="rect">
-            <a:avLst/>
-          </a:prstGeom>
-          <a:noFill/>
-          <a:extLst>
-            <a:ext uri="{909E8E84-426E-40DD-AFC4-6F175D3DCCD1}">
-              <a14:hiddenFill xmlns:a14="http://schemas.microsoft.com/office/drawing/2010/main">
-                <a:solidFill>
-                  <a:srgbClr val="FFFFFF"/>
-                </a:solidFill>
-              </a14:hiddenFill>
-            </a:ext>
-          </a:extLst>
-        </p:spPr>
-      </p:pic>
-      <p:pic>
-        <p:nvPicPr>
-          <p:cNvPr id="2052" name="Picture 4" descr="C:\Users\User\Desktop\Преза проекта\coco3.png"/>
-          <p:cNvPicPr>
-            <a:picLocks noChangeAspect="1" noChangeArrowheads="1"/>
-          </p:cNvPicPr>
-          <p:nvPr/>
-        </p:nvPicPr>
-        <p:blipFill>
-          <a:blip r:embed="rId5">
-            <a:extLst>
-              <a:ext uri="{28A0092B-C50C-407E-A947-70E740481C1C}">
-                <a14:useLocalDpi xmlns:a14="http://schemas.microsoft.com/office/drawing/2010/main" val="0"/>
-              </a:ext>
-            </a:extLst>
-          </a:blip>
-          <a:srcRect/>
-          <a:stretch>
-            <a:fillRect/>
-          </a:stretch>
-        </p:blipFill>
-        <p:spPr bwMode="auto">
-          <a:xfrm>
-            <a:off x="0" y="5509884"/>
-            <a:ext cx="9144000" cy="458510"/>
+            <a:off x="0" y="5695950"/>
+            <a:ext cx="9144000" cy="297560"/>
           </a:xfrm>
           <a:prstGeom prst="rect">
             <a:avLst/>
@@ -8348,7 +8414,7 @@
             </a:r>
           </a:p>
           <a:p>
-            <a:pPr marL="900113" indent="-360363" algn="l">
+            <a:pPr marL="993775" indent="-454025" algn="l">
               <a:buFont typeface="+mj-lt"/>
               <a:buAutoNum type="arabicPeriod"/>
             </a:pPr>
@@ -8361,7 +8427,7 @@
             </a:r>
           </a:p>
           <a:p>
-            <a:pPr marL="900113" indent="-360363" algn="l">
+            <a:pPr marL="993775" indent="-454025" algn="l">
               <a:buFont typeface="+mj-lt"/>
               <a:buAutoNum type="arabicPeriod"/>
             </a:pPr>
@@ -8370,11 +8436,36 @@
                 <a:latin typeface="Arial" pitchFamily="34" charset="0"/>
                 <a:cs typeface="Arial" pitchFamily="34" charset="0"/>
               </a:rPr>
-              <a:t>3-step identity verification;</a:t>
-            </a:r>
-          </a:p>
-          <a:p>
-            <a:pPr marL="900113" indent="-360363" algn="l">
+              <a:t>3-step identity </a:t>
+            </a:r>
+            <a:r>
+              <a:rPr lang="en-US" sz="2400" dirty="0" smtClean="0">
+                <a:latin typeface="Arial" pitchFamily="34" charset="0"/>
+                <a:cs typeface="Arial" pitchFamily="34" charset="0"/>
+              </a:rPr>
+              <a:t>verification</a:t>
+            </a:r>
+            <a:r>
+              <a:rPr lang="ru-RU" sz="2400" dirty="0" smtClean="0">
+                <a:latin typeface="Arial" pitchFamily="34" charset="0"/>
+                <a:cs typeface="Arial" pitchFamily="34" charset="0"/>
+              </a:rPr>
+              <a:t> (</a:t>
+            </a:r>
+            <a:r>
+              <a:rPr lang="en-US" sz="2400" dirty="0" smtClean="0">
+                <a:latin typeface="Arial" pitchFamily="34" charset="0"/>
+                <a:cs typeface="Arial" pitchFamily="34" charset="0"/>
+              </a:rPr>
+              <a:t>profile, e-mail, passport scan);</a:t>
+            </a:r>
+            <a:endParaRPr lang="en-US" sz="2400" dirty="0" smtClean="0">
+              <a:latin typeface="Arial" pitchFamily="34" charset="0"/>
+              <a:cs typeface="Arial" pitchFamily="34" charset="0"/>
+            </a:endParaRPr>
+          </a:p>
+          <a:p>
+            <a:pPr marL="993775" indent="-454025" algn="l">
               <a:buFont typeface="+mj-lt"/>
               <a:buAutoNum type="arabicPeriod"/>
             </a:pPr>
@@ -8383,11 +8474,22 @@
                 <a:latin typeface="Arial" pitchFamily="34" charset="0"/>
                 <a:cs typeface="Arial" pitchFamily="34" charset="0"/>
               </a:rPr>
-              <a:t>Technical support questions;</a:t>
-            </a:r>
-          </a:p>
-          <a:p>
-            <a:pPr marL="900113" indent="-360363" algn="l">
+              <a:t>Technical </a:t>
+            </a:r>
+            <a:r>
+              <a:rPr lang="en-US" sz="2400" dirty="0" smtClean="0">
+                <a:latin typeface="Arial" pitchFamily="34" charset="0"/>
+                <a:cs typeface="Arial" pitchFamily="34" charset="0"/>
+              </a:rPr>
+              <a:t>support;</a:t>
+            </a:r>
+            <a:endParaRPr lang="en-US" sz="2400" dirty="0" smtClean="0">
+              <a:latin typeface="Arial" pitchFamily="34" charset="0"/>
+              <a:cs typeface="Arial" pitchFamily="34" charset="0"/>
+            </a:endParaRPr>
+          </a:p>
+          <a:p>
+            <a:pPr marL="993775" indent="-454025" algn="l">
               <a:buFont typeface="+mj-lt"/>
               <a:buAutoNum type="arabicPeriod"/>
             </a:pPr>
@@ -8400,7 +8502,7 @@
             </a:r>
           </a:p>
           <a:p>
-            <a:pPr marL="900113" indent="-360363" algn="l">
+            <a:pPr marL="993775" indent="-454025" algn="l">
               <a:buFont typeface="+mj-lt"/>
               <a:buAutoNum type="arabicPeriod"/>
             </a:pPr>
@@ -8413,7 +8515,7 @@
             </a:r>
           </a:p>
           <a:p>
-            <a:pPr marL="900113" indent="-360363" algn="l">
+            <a:pPr marL="993775" indent="-454025" algn="l">
               <a:buFont typeface="+mj-lt"/>
               <a:buAutoNum type="arabicPeriod"/>
             </a:pPr>
@@ -8426,7 +8528,7 @@
             </a:r>
           </a:p>
           <a:p>
-            <a:pPr marL="900113" indent="-360363" algn="l">
+            <a:pPr marL="993775" indent="-454025" algn="l">
               <a:buFont typeface="+mj-lt"/>
               <a:buAutoNum type="arabicPeriod"/>
             </a:pPr>
@@ -8435,11 +8537,18 @@
                 <a:latin typeface="Arial" pitchFamily="34" charset="0"/>
                 <a:cs typeface="Arial" pitchFamily="34" charset="0"/>
               </a:rPr>
-              <a:t>Replenish/withdraw money, take loan;</a:t>
-            </a:r>
-          </a:p>
-          <a:p>
-            <a:pPr marL="900113" indent="-360363" algn="l">
+              <a:t>Replenish/withdraw </a:t>
+            </a:r>
+            <a:r>
+              <a:rPr lang="en-US" sz="2400" dirty="0" smtClean="0">
+                <a:latin typeface="Arial" pitchFamily="34" charset="0"/>
+                <a:cs typeface="Arial" pitchFamily="34" charset="0"/>
+              </a:rPr>
+              <a:t>money;</a:t>
+            </a:r>
+          </a:p>
+          <a:p>
+            <a:pPr marL="993775" indent="-454025" algn="l">
               <a:buFont typeface="+mj-lt"/>
               <a:buAutoNum type="arabicPeriod"/>
             </a:pPr>
@@ -8448,11 +8557,15 @@
                 <a:latin typeface="Arial" pitchFamily="34" charset="0"/>
                 <a:cs typeface="Arial" pitchFamily="34" charset="0"/>
               </a:rPr>
-              <a:t>View operation history;</a:t>
-            </a:r>
-          </a:p>
-          <a:p>
-            <a:pPr marL="900113" indent="-360363" algn="l">
+              <a:t>Take/pay loan;</a:t>
+            </a:r>
+            <a:endParaRPr lang="en-US" sz="2400" dirty="0" smtClean="0">
+              <a:latin typeface="Arial" pitchFamily="34" charset="0"/>
+              <a:cs typeface="Arial" pitchFamily="34" charset="0"/>
+            </a:endParaRPr>
+          </a:p>
+          <a:p>
+            <a:pPr marL="993775" indent="-454025" algn="l">
               <a:buFont typeface="+mj-lt"/>
               <a:buAutoNum type="arabicPeriod"/>
             </a:pPr>
@@ -8461,7 +8574,27 @@
                 <a:latin typeface="Arial" pitchFamily="34" charset="0"/>
                 <a:cs typeface="Arial" pitchFamily="34" charset="0"/>
               </a:rPr>
-              <a:t>Play slots…</a:t>
+              <a:t>View operation history;</a:t>
+            </a:r>
+          </a:p>
+          <a:p>
+            <a:pPr marL="993775" indent="-454025" algn="l">
+              <a:buFont typeface="+mj-lt"/>
+              <a:buAutoNum type="arabicPeriod"/>
+            </a:pPr>
+            <a:r>
+              <a:rPr lang="en-US" sz="2400" dirty="0" smtClean="0">
+                <a:latin typeface="Arial" pitchFamily="34" charset="0"/>
+                <a:cs typeface="Arial" pitchFamily="34" charset="0"/>
+              </a:rPr>
+              <a:t>Play </a:t>
+            </a:r>
+            <a:r>
+              <a:rPr lang="en-US" sz="2400" dirty="0" smtClean="0">
+                <a:latin typeface="Arial" pitchFamily="34" charset="0"/>
+                <a:cs typeface="Arial" pitchFamily="34" charset="0"/>
+              </a:rPr>
+              <a:t>slots.</a:t>
             </a:r>
             <a:endParaRPr lang="ru-RU" sz="2400" dirty="0">
               <a:latin typeface="Arial" pitchFamily="34" charset="0"/>
@@ -8644,7 +8777,14 @@
                 <a:latin typeface="Arial" pitchFamily="34" charset="0"/>
                 <a:cs typeface="Arial" pitchFamily="34" charset="0"/>
               </a:rPr>
-              <a:t>Builder and Factory (Command factory);</a:t>
+              <a:t>Factory </a:t>
+            </a:r>
+            <a:r>
+              <a:rPr lang="en-US" sz="2400" dirty="0" smtClean="0">
+                <a:latin typeface="Arial" pitchFamily="34" charset="0"/>
+                <a:cs typeface="Arial" pitchFamily="34" charset="0"/>
+              </a:rPr>
+              <a:t>(Command factory);</a:t>
             </a:r>
             <a:endParaRPr lang="en-US" sz="2400" dirty="0">
               <a:latin typeface="Arial" pitchFamily="34" charset="0"/>
@@ -8697,26 +8837,23 @@
               <a:buAutoNum type="arabicPeriod"/>
             </a:pPr>
             <a:r>
-              <a:rPr lang="en-US" sz="2400" dirty="0" smtClean="0">
-                <a:latin typeface="Arial" pitchFamily="34" charset="0"/>
-                <a:cs typeface="Arial" pitchFamily="34" charset="0"/>
-              </a:rPr>
-              <a:t>Observer (</a:t>
-            </a:r>
-            <a:r>
-              <a:rPr lang="en-US" sz="2400" dirty="0" err="1" smtClean="0">
-                <a:latin typeface="Arial" pitchFamily="34" charset="0"/>
-                <a:cs typeface="Arial" pitchFamily="34" charset="0"/>
-              </a:rPr>
-              <a:t>WebListeners</a:t>
-            </a:r>
-            <a:r>
-              <a:rPr lang="en-US" sz="2400" dirty="0" smtClean="0">
-                <a:latin typeface="Arial" pitchFamily="34" charset="0"/>
-                <a:cs typeface="Arial" pitchFamily="34" charset="0"/>
-              </a:rPr>
-              <a:t>);</a:t>
-            </a:r>
+              <a:rPr lang="en-US" sz="2400" dirty="0">
+                <a:latin typeface="Arial" pitchFamily="34" charset="0"/>
+                <a:cs typeface="Arial" pitchFamily="34" charset="0"/>
+              </a:rPr>
+              <a:t>MVC Layered </a:t>
+            </a:r>
+            <a:r>
+              <a:rPr lang="en-US" sz="2400" dirty="0" smtClean="0">
+                <a:latin typeface="Arial" pitchFamily="34" charset="0"/>
+                <a:cs typeface="Arial" pitchFamily="34" charset="0"/>
+              </a:rPr>
+              <a:t>architecture;</a:t>
+            </a:r>
+            <a:endParaRPr lang="en-US" sz="2400" dirty="0" smtClean="0">
+              <a:latin typeface="Arial" pitchFamily="34" charset="0"/>
+              <a:cs typeface="Arial" pitchFamily="34" charset="0"/>
+            </a:endParaRPr>
           </a:p>
           <a:p>
             <a:pPr marL="1071563" indent="-531813" algn="l">
@@ -8728,14 +8865,7 @@
                 <a:latin typeface="Arial" pitchFamily="34" charset="0"/>
                 <a:cs typeface="Arial" pitchFamily="34" charset="0"/>
               </a:rPr>
-              <a:t>DAO</a:t>
-            </a:r>
-            <a:r>
-              <a:rPr lang="en-US" sz="2400" dirty="0" smtClean="0">
-                <a:latin typeface="Arial" pitchFamily="34" charset="0"/>
-                <a:cs typeface="Arial" pitchFamily="34" charset="0"/>
-              </a:rPr>
-              <a:t>;</a:t>
+              <a:t>Controller;</a:t>
             </a:r>
           </a:p>
           <a:p>
@@ -8744,11 +8874,18 @@
               <a:buAutoNum type="arabicPeriod"/>
             </a:pPr>
             <a:r>
-              <a:rPr lang="en-US" sz="2400" dirty="0" smtClean="0">
-                <a:latin typeface="Arial" pitchFamily="34" charset="0"/>
-                <a:cs typeface="Arial" pitchFamily="34" charset="0"/>
-              </a:rPr>
-              <a:t>Command;</a:t>
+              <a:rPr lang="en-US" sz="2400" dirty="0">
+                <a:latin typeface="Arial" pitchFamily="34" charset="0"/>
+                <a:cs typeface="Arial" pitchFamily="34" charset="0"/>
+              </a:rPr>
+              <a:t>Command</a:t>
+            </a:r>
+            <a:r>
+              <a:rPr lang="en-US" sz="2400" dirty="0" smtClean="0">
+                <a:latin typeface="Arial" pitchFamily="34" charset="0"/>
+                <a:cs typeface="Arial" pitchFamily="34" charset="0"/>
+              </a:rPr>
+              <a:t>;</a:t>
             </a:r>
             <a:endParaRPr lang="en-US" sz="2400" dirty="0" smtClean="0">
               <a:latin typeface="Arial" pitchFamily="34" charset="0"/>
@@ -8765,15 +8902,12 @@
                 <a:latin typeface="Arial" pitchFamily="34" charset="0"/>
                 <a:cs typeface="Arial" pitchFamily="34" charset="0"/>
               </a:rPr>
-              <a:t>MVC Layered </a:t>
-            </a:r>
-            <a:r>
-              <a:rPr lang="en-US" sz="2400" dirty="0" smtClean="0">
-                <a:latin typeface="Arial" pitchFamily="34" charset="0"/>
-                <a:cs typeface="Arial" pitchFamily="34" charset="0"/>
-              </a:rPr>
-              <a:t>architecture;</a:t>
-            </a:r>
+              <a:t>DAO;</a:t>
+            </a:r>
+            <a:endParaRPr lang="en-US" sz="2400" dirty="0" smtClean="0">
+              <a:latin typeface="Arial" pitchFamily="34" charset="0"/>
+              <a:cs typeface="Arial" pitchFamily="34" charset="0"/>
+            </a:endParaRPr>
           </a:p>
           <a:p>
             <a:pPr marL="1071563" indent="-531813" algn="l">
@@ -8785,22 +8919,26 @@
                 <a:latin typeface="Arial" pitchFamily="34" charset="0"/>
                 <a:cs typeface="Arial" pitchFamily="34" charset="0"/>
               </a:rPr>
-              <a:t>Lazy initialization (</a:t>
+              <a:t>AOP features (</a:t>
             </a:r>
             <a:r>
               <a:rPr lang="en-US" sz="2400" dirty="0" err="1" smtClean="0">
                 <a:latin typeface="Arial" pitchFamily="34" charset="0"/>
                 <a:cs typeface="Arial" pitchFamily="34" charset="0"/>
               </a:rPr>
-              <a:t>DAOHelper#getDAOinstance</a:t>
-            </a:r>
-            <a:r>
-              <a:rPr lang="en-US" sz="2400" dirty="0" smtClean="0">
-                <a:latin typeface="Arial" pitchFamily="34" charset="0"/>
-                <a:cs typeface="Arial" pitchFamily="34" charset="0"/>
-              </a:rPr>
-              <a:t>);</a:t>
-            </a:r>
+              <a:t>eg</a:t>
+            </a:r>
+            <a:r>
+              <a:rPr lang="en-US" sz="2400" dirty="0" smtClean="0">
+                <a:latin typeface="Arial" pitchFamily="34" charset="0"/>
+                <a:cs typeface="Arial" pitchFamily="34" charset="0"/>
+              </a:rPr>
+              <a:t> Request logging);</a:t>
+            </a:r>
+            <a:endParaRPr lang="en-US" sz="2400" dirty="0" smtClean="0">
+              <a:latin typeface="Arial" pitchFamily="34" charset="0"/>
+              <a:cs typeface="Arial" pitchFamily="34" charset="0"/>
+            </a:endParaRPr>
           </a:p>
           <a:p>
             <a:pPr marL="1071563" indent="-531813" algn="l">
@@ -8812,7 +8950,21 @@
                 <a:latin typeface="Arial" pitchFamily="34" charset="0"/>
                 <a:cs typeface="Arial" pitchFamily="34" charset="0"/>
               </a:rPr>
-              <a:t>PRG (Navigation/F5-protection);</a:t>
+              <a:t>Lazy initialization (</a:t>
+            </a:r>
+            <a:r>
+              <a:rPr lang="en-US" sz="2400" dirty="0" err="1" smtClean="0">
+                <a:latin typeface="Arial" pitchFamily="34" charset="0"/>
+                <a:cs typeface="Arial" pitchFamily="34" charset="0"/>
+              </a:rPr>
+              <a:t>DAOHelper#getDAOinstance</a:t>
+            </a:r>
+            <a:r>
+              <a:rPr lang="en-US" sz="2400" dirty="0" smtClean="0">
+                <a:latin typeface="Arial" pitchFamily="34" charset="0"/>
+                <a:cs typeface="Arial" pitchFamily="34" charset="0"/>
+              </a:rPr>
+              <a:t>);</a:t>
             </a:r>
           </a:p>
           <a:p>
@@ -8825,7 +8977,7 @@
                 <a:latin typeface="Arial" pitchFamily="34" charset="0"/>
                 <a:cs typeface="Arial" pitchFamily="34" charset="0"/>
               </a:rPr>
-              <a:t>ACID transaction system (database transactions);</a:t>
+              <a:t>PRG (Navigation/F5-protection);</a:t>
             </a:r>
           </a:p>
           <a:p>
@@ -8838,7 +8990,14 @@
                 <a:latin typeface="Arial" pitchFamily="34" charset="0"/>
                 <a:cs typeface="Arial" pitchFamily="34" charset="0"/>
               </a:rPr>
-              <a:t>Common GRASP patterns;</a:t>
+              <a:t>ACID transaction system (database transactions</a:t>
+            </a:r>
+            <a:r>
+              <a:rPr lang="en-US" sz="2400" dirty="0" smtClean="0">
+                <a:latin typeface="Arial" pitchFamily="34" charset="0"/>
+                <a:cs typeface="Arial" pitchFamily="34" charset="0"/>
+              </a:rPr>
+              <a:t>);</a:t>
             </a:r>
           </a:p>
           <a:p>
@@ -8851,7 +9010,14 @@
                 <a:latin typeface="Arial" pitchFamily="34" charset="0"/>
                 <a:cs typeface="Arial" pitchFamily="34" charset="0"/>
               </a:rPr>
-              <a:t>Other.</a:t>
+              <a:t>Other</a:t>
+            </a:r>
+            <a:r>
+              <a:rPr lang="en-US" sz="2400" dirty="0" smtClean="0">
+                <a:latin typeface="Arial" pitchFamily="34" charset="0"/>
+                <a:cs typeface="Arial" pitchFamily="34" charset="0"/>
+              </a:rPr>
+              <a:t>.</a:t>
             </a:r>
           </a:p>
           <a:p>
@@ -8899,7 +9065,7 @@
         </p:blipFill>
         <p:spPr bwMode="auto">
           <a:xfrm>
-            <a:off x="6227379" y="2362141"/>
+            <a:off x="6195847" y="2488269"/>
             <a:ext cx="2823231" cy="1672747"/>
           </a:xfrm>
           <a:prstGeom prst="rect">
@@ -9715,20 +9881,20 @@
           <p:nvPr/>
         </p:nvPicPr>
         <p:blipFill rotWithShape="1">
-          <a:blip r:embed="rId2" cstate="print">
+          <a:blip r:embed="rId2">
             <a:extLst>
               <a:ext uri="{28A0092B-C50C-407E-A947-70E740481C1C}">
                 <a14:useLocalDpi xmlns:a14="http://schemas.microsoft.com/office/drawing/2010/main" val="0"/>
               </a:ext>
             </a:extLst>
           </a:blip>
-          <a:srcRect/>
+          <a:srcRect l="2932" t="-534" r="2586" b="2054"/>
           <a:stretch/>
         </p:blipFill>
         <p:spPr bwMode="auto">
           <a:xfrm>
-            <a:off x="0" y="1196752"/>
-            <a:ext cx="9144000" cy="5661248"/>
+            <a:off x="-3" y="1466193"/>
+            <a:ext cx="9143999" cy="5391807"/>
           </a:xfrm>
           <a:prstGeom prst="rect">
             <a:avLst/>
@@ -10055,8 +10221,19 @@
                 <a:latin typeface="Arial" pitchFamily="34" charset="0"/>
                 <a:cs typeface="Arial" pitchFamily="34" charset="0"/>
               </a:rPr>
-              <a:t>View technical support questions and answer them;</a:t>
-            </a:r>
+              <a:t>Technical support administration</a:t>
+            </a:r>
+            <a:r>
+              <a:rPr lang="en-US" sz="2400" dirty="0" smtClean="0">
+                <a:latin typeface="Arial" pitchFamily="34" charset="0"/>
+                <a:cs typeface="Arial" pitchFamily="34" charset="0"/>
+              </a:rPr>
+              <a:t>;</a:t>
+            </a:r>
+            <a:endParaRPr lang="en-US" sz="2400" dirty="0" smtClean="0">
+              <a:latin typeface="Arial" pitchFamily="34" charset="0"/>
+              <a:cs typeface="Arial" pitchFamily="34" charset="0"/>
+            </a:endParaRPr>
           </a:p>
           <a:p>
             <a:pPr marL="900113" indent="-360363" algn="l">
@@ -10483,11 +10660,11 @@
               <a:buAutoNum type="arabicPeriod"/>
             </a:pPr>
             <a:r>
-              <a:rPr lang="en-US" sz="2400" dirty="0" smtClean="0">
-                <a:latin typeface="Arial" pitchFamily="34" charset="0"/>
-                <a:cs typeface="Arial" pitchFamily="34" charset="0"/>
-              </a:rPr>
-              <a:t>View/choose playing lines;</a:t>
+              <a:rPr lang="en-US" sz="2400" dirty="0">
+                <a:latin typeface="Arial" pitchFamily="34" charset="0"/>
+                <a:cs typeface="Arial" pitchFamily="34" charset="0"/>
+              </a:rPr>
+              <a:t>Spin;</a:t>
             </a:r>
           </a:p>
           <a:p>
@@ -10500,7 +10677,14 @@
                 <a:latin typeface="Arial" pitchFamily="34" charset="0"/>
                 <a:cs typeface="Arial" pitchFamily="34" charset="0"/>
               </a:rPr>
-              <a:t>Choose bet amount;</a:t>
+              <a:t>View/choose </a:t>
+            </a:r>
+            <a:r>
+              <a:rPr lang="en-US" sz="2400" dirty="0" smtClean="0">
+                <a:latin typeface="Arial" pitchFamily="34" charset="0"/>
+                <a:cs typeface="Arial" pitchFamily="34" charset="0"/>
+              </a:rPr>
+              <a:t>playing lines;</a:t>
             </a:r>
           </a:p>
           <a:p>
@@ -10513,7 +10697,7 @@
                 <a:latin typeface="Arial" pitchFamily="34" charset="0"/>
                 <a:cs typeface="Arial" pitchFamily="34" charset="0"/>
               </a:rPr>
-              <a:t>Choose each reel offset;</a:t>
+              <a:t>Choose bet amount;</a:t>
             </a:r>
           </a:p>
           <a:p>
@@ -10526,7 +10710,7 @@
                 <a:latin typeface="Arial" pitchFamily="34" charset="0"/>
                 <a:cs typeface="Arial" pitchFamily="34" charset="0"/>
               </a:rPr>
-              <a:t>Finish streak;</a:t>
+              <a:t>Choose each reel offset;</a:t>
             </a:r>
           </a:p>
           <a:p>
@@ -10539,7 +10723,14 @@
                 <a:latin typeface="Arial" pitchFamily="34" charset="0"/>
                 <a:cs typeface="Arial" pitchFamily="34" charset="0"/>
               </a:rPr>
-              <a:t>View player operation history;</a:t>
+              <a:t>Finish streak</a:t>
+            </a:r>
+            <a:r>
+              <a:rPr lang="en-US" sz="2400" dirty="0" smtClean="0">
+                <a:latin typeface="Arial" pitchFamily="34" charset="0"/>
+                <a:cs typeface="Arial" pitchFamily="34" charset="0"/>
+              </a:rPr>
+              <a:t>;</a:t>
             </a:r>
           </a:p>
           <a:p>
@@ -10552,8 +10743,12 @@
                 <a:latin typeface="Arial" pitchFamily="34" charset="0"/>
                 <a:cs typeface="Arial" pitchFamily="34" charset="0"/>
               </a:rPr>
-              <a:t>Turn on/off music;</a:t>
-            </a:r>
+              <a:t>Keyboard control bindings;</a:t>
+            </a:r>
+            <a:endParaRPr lang="en-US" sz="2400" dirty="0" smtClean="0">
+              <a:latin typeface="Arial" pitchFamily="34" charset="0"/>
+              <a:cs typeface="Arial" pitchFamily="34" charset="0"/>
+            </a:endParaRPr>
           </a:p>
           <a:p>
             <a:pPr marL="900113" indent="-360363" algn="l">
@@ -10565,8 +10760,98 @@
                 <a:latin typeface="Arial" pitchFamily="34" charset="0"/>
                 <a:cs typeface="Arial" pitchFamily="34" charset="0"/>
               </a:rPr>
-              <a:t>“Demo” and “For real money” play modes.</a:t>
-            </a:r>
+              <a:t>Turn </a:t>
+            </a:r>
+            <a:r>
+              <a:rPr lang="en-US" sz="2400" dirty="0" smtClean="0">
+                <a:latin typeface="Arial" pitchFamily="34" charset="0"/>
+                <a:cs typeface="Arial" pitchFamily="34" charset="0"/>
+              </a:rPr>
+              <a:t>on/off </a:t>
+            </a:r>
+            <a:r>
+              <a:rPr lang="en-US" sz="2400" dirty="0" smtClean="0">
+                <a:latin typeface="Arial" pitchFamily="34" charset="0"/>
+                <a:cs typeface="Arial" pitchFamily="34" charset="0"/>
+              </a:rPr>
+              <a:t>music and sound design;</a:t>
+            </a:r>
+            <a:endParaRPr lang="en-US" sz="2400" dirty="0" smtClean="0">
+              <a:latin typeface="Arial" pitchFamily="34" charset="0"/>
+              <a:cs typeface="Arial" pitchFamily="34" charset="0"/>
+            </a:endParaRPr>
+          </a:p>
+          <a:p>
+            <a:pPr marL="900113" indent="-360363" algn="l">
+              <a:buFont typeface="+mj-lt"/>
+              <a:buAutoNum type="arabicPeriod"/>
+            </a:pPr>
+            <a:r>
+              <a:rPr lang="en-US" sz="2400" dirty="0" smtClean="0">
+                <a:latin typeface="Arial" pitchFamily="34" charset="0"/>
+                <a:cs typeface="Arial" pitchFamily="34" charset="0"/>
+              </a:rPr>
+              <a:t>“Demo” and “For real money” play </a:t>
+            </a:r>
+            <a:r>
+              <a:rPr lang="en-US" sz="2400" dirty="0" smtClean="0">
+                <a:latin typeface="Arial" pitchFamily="34" charset="0"/>
+                <a:cs typeface="Arial" pitchFamily="34" charset="0"/>
+              </a:rPr>
+              <a:t>modes;</a:t>
+            </a:r>
+          </a:p>
+          <a:p>
+            <a:pPr marL="900113" indent="-360363" algn="l">
+              <a:buFont typeface="+mj-lt"/>
+              <a:buAutoNum type="arabicPeriod"/>
+            </a:pPr>
+            <a:r>
+              <a:rPr lang="en-US" sz="2400" dirty="0" smtClean="0">
+                <a:latin typeface="Arial" pitchFamily="34" charset="0"/>
+                <a:cs typeface="Arial" pitchFamily="34" charset="0"/>
+              </a:rPr>
+              <a:t>MD5 Fairness </a:t>
+            </a:r>
+            <a:r>
+              <a:rPr lang="en-US" sz="2400" dirty="0">
+                <a:latin typeface="Arial" pitchFamily="34" charset="0"/>
+                <a:cs typeface="Arial" pitchFamily="34" charset="0"/>
+              </a:rPr>
+              <a:t>Check</a:t>
+            </a:r>
+            <a:r>
+              <a:rPr lang="en-US" sz="2400" dirty="0" smtClean="0">
+                <a:latin typeface="Arial" pitchFamily="34" charset="0"/>
+                <a:cs typeface="Arial" pitchFamily="34" charset="0"/>
+              </a:rPr>
+              <a:t> “</a:t>
+            </a:r>
+            <a:r>
+              <a:rPr lang="en-US" sz="2400" dirty="0" err="1" smtClean="0">
+                <a:latin typeface="Arial" pitchFamily="34" charset="0"/>
+                <a:cs typeface="Arial" pitchFamily="34" charset="0"/>
+              </a:rPr>
+              <a:t>FairPlay</a:t>
+            </a:r>
+            <a:r>
+              <a:rPr lang="en-US" sz="2400" dirty="0" smtClean="0">
+                <a:latin typeface="Arial" pitchFamily="34" charset="0"/>
+                <a:cs typeface="Arial" pitchFamily="34" charset="0"/>
+              </a:rPr>
+              <a:t>”</a:t>
+            </a:r>
+            <a:r>
+              <a:rPr lang="en-US" sz="2400" dirty="0" smtClean="0">
+                <a:latin typeface="Arial" pitchFamily="34" charset="0"/>
+                <a:cs typeface="Arial" pitchFamily="34" charset="0"/>
+              </a:rPr>
+              <a:t>.</a:t>
+            </a:r>
+            <a:endParaRPr lang="en-US" sz="2400" dirty="0" smtClean="0">
+              <a:latin typeface="Arial" pitchFamily="34" charset="0"/>
+              <a:cs typeface="Arial" pitchFamily="34" charset="0"/>
+            </a:endParaRPr>
           </a:p>
         </p:txBody>
       </p:sp>
@@ -10593,7 +10878,7 @@
         </p:blipFill>
         <p:spPr bwMode="auto">
           <a:xfrm>
-            <a:off x="6430251" y="4226582"/>
+            <a:off x="6863260" y="4226582"/>
             <a:ext cx="2438400" cy="2438400"/>
           </a:xfrm>
           <a:prstGeom prst="rect">
@@ -10657,20 +10942,20 @@
           <p:nvPr/>
         </p:nvPicPr>
         <p:blipFill rotWithShape="1">
-          <a:blip r:embed="rId2" cstate="print">
+          <a:blip r:embed="rId2">
             <a:extLst>
               <a:ext uri="{28A0092B-C50C-407E-A947-70E740481C1C}">
                 <a14:useLocalDpi xmlns:a14="http://schemas.microsoft.com/office/drawing/2010/main" val="0"/>
               </a:ext>
             </a:extLst>
           </a:blip>
-          <a:srcRect/>
+          <a:srcRect l="2069" t="2126" r="5173" b="2916"/>
           <a:stretch/>
         </p:blipFill>
         <p:spPr bwMode="auto">
           <a:xfrm>
             <a:off x="0" y="1196752"/>
-            <a:ext cx="9144000" cy="5644055"/>
+            <a:ext cx="9144000" cy="5661248"/>
           </a:xfrm>
           <a:prstGeom prst="rect">
             <a:avLst/>
@@ -10984,14 +11269,14 @@
                 <a:latin typeface="Arial" pitchFamily="34" charset="0"/>
                 <a:cs typeface="Arial" pitchFamily="34" charset="0"/>
               </a:rPr>
-              <a:t>Custom user navigation </a:t>
-            </a:r>
-            <a:r>
-              <a:rPr lang="en-US" sz="2400" dirty="0" smtClean="0">
-                <a:latin typeface="Arial" pitchFamily="34" charset="0"/>
-                <a:cs typeface="Arial" pitchFamily="34" charset="0"/>
-              </a:rPr>
-              <a:t>prevention;</a:t>
+              <a:t>Custom user </a:t>
+            </a:r>
+            <a:r>
+              <a:rPr lang="en-US" sz="2400" dirty="0" smtClean="0">
+                <a:latin typeface="Arial" pitchFamily="34" charset="0"/>
+                <a:cs typeface="Arial" pitchFamily="34" charset="0"/>
+              </a:rPr>
+              <a:t>navigation prevention;</a:t>
             </a:r>
           </a:p>
           <a:p>
@@ -11004,7 +11289,14 @@
                 <a:latin typeface="Arial" pitchFamily="34" charset="0"/>
                 <a:cs typeface="Arial" pitchFamily="34" charset="0"/>
               </a:rPr>
-              <a:t>SQL injection protection;</a:t>
+              <a:t>SQL </a:t>
+            </a:r>
+            <a:r>
+              <a:rPr lang="en-US" sz="2400" dirty="0" smtClean="0">
+                <a:latin typeface="Arial" pitchFamily="34" charset="0"/>
+                <a:cs typeface="Arial" pitchFamily="34" charset="0"/>
+              </a:rPr>
+              <a:t>injection protection;</a:t>
             </a:r>
           </a:p>
           <a:p>
@@ -11261,7 +11553,14 @@
                 <a:latin typeface="Arial" pitchFamily="34" charset="0"/>
                 <a:cs typeface="Arial" pitchFamily="34" charset="0"/>
               </a:rPr>
-              <a:t>/En);</a:t>
+              <a:t>/En</a:t>
+            </a:r>
+            <a:r>
+              <a:rPr lang="en-US" sz="2400" dirty="0" smtClean="0">
+                <a:latin typeface="Arial" pitchFamily="34" charset="0"/>
+                <a:cs typeface="Arial" pitchFamily="34" charset="0"/>
+              </a:rPr>
+              <a:t>);</a:t>
             </a:r>
           </a:p>
           <a:p>
@@ -11270,12 +11569,30 @@
               <a:buAutoNum type="arabicPeriod"/>
             </a:pPr>
             <a:r>
-              <a:rPr lang="en-US" sz="2400" dirty="0" smtClean="0">
-                <a:latin typeface="Arial" pitchFamily="34" charset="0"/>
-                <a:cs typeface="Arial" pitchFamily="34" charset="0"/>
-              </a:rPr>
-              <a:t>News feed;</a:t>
-            </a:r>
+              <a:rPr lang="en-US" sz="2400" dirty="0">
+                <a:latin typeface="Arial" pitchFamily="34" charset="0"/>
+                <a:cs typeface="Arial" pitchFamily="34" charset="0"/>
+              </a:rPr>
+              <a:t>Support for mobile devices with small </a:t>
+            </a:r>
+            <a:r>
+              <a:rPr lang="en-US" sz="2400" dirty="0" smtClean="0">
+                <a:latin typeface="Arial" pitchFamily="34" charset="0"/>
+                <a:cs typeface="Arial" pitchFamily="34" charset="0"/>
+              </a:rPr>
+              <a:t>screens</a:t>
+            </a:r>
+            <a:r>
+              <a:rPr lang="en-US" sz="2400" dirty="0">
+                <a:latin typeface="Arial" pitchFamily="34" charset="0"/>
+                <a:cs typeface="Arial" pitchFamily="34" charset="0"/>
+              </a:rPr>
+              <a:t>;</a:t>
+            </a:r>
+            <a:endParaRPr lang="en-US" sz="2400" dirty="0" smtClean="0">
+              <a:latin typeface="Arial" pitchFamily="34" charset="0"/>
+              <a:cs typeface="Arial" pitchFamily="34" charset="0"/>
+            </a:endParaRPr>
           </a:p>
           <a:p>
             <a:pPr marL="900113" indent="-360363" algn="l">
@@ -11287,7 +11604,7 @@
                 <a:latin typeface="Arial" pitchFamily="34" charset="0"/>
                 <a:cs typeface="Arial" pitchFamily="34" charset="0"/>
               </a:rPr>
-              <a:t>Pagination support;</a:t>
+              <a:t>News feed;</a:t>
             </a:r>
           </a:p>
           <a:p>
@@ -11300,8 +11617,59 @@
                 <a:latin typeface="Arial" pitchFamily="34" charset="0"/>
                 <a:cs typeface="Arial" pitchFamily="34" charset="0"/>
               </a:rPr>
-              <a:t>Support for mobile devices with small screens.</a:t>
-            </a:r>
+              <a:t>Pagination support</a:t>
+            </a:r>
+            <a:r>
+              <a:rPr lang="en-US" sz="2400" dirty="0" smtClean="0">
+                <a:latin typeface="Arial" pitchFamily="34" charset="0"/>
+                <a:cs typeface="Arial" pitchFamily="34" charset="0"/>
+              </a:rPr>
+              <a:t>;</a:t>
+            </a:r>
+          </a:p>
+          <a:p>
+            <a:pPr marL="900113" indent="-360363" algn="l">
+              <a:buFont typeface="+mj-lt"/>
+              <a:buAutoNum type="arabicPeriod"/>
+            </a:pPr>
+            <a:r>
+              <a:rPr lang="en-US" sz="2400" dirty="0">
+                <a:latin typeface="Arial" pitchFamily="34" charset="0"/>
+                <a:cs typeface="Arial" pitchFamily="34" charset="0"/>
+              </a:rPr>
+              <a:t>File upload support;</a:t>
+            </a:r>
+          </a:p>
+          <a:p>
+            <a:pPr marL="900113" indent="-360363" algn="l">
+              <a:buFont typeface="+mj-lt"/>
+              <a:buAutoNum type="arabicPeriod"/>
+            </a:pPr>
+            <a:r>
+              <a:rPr lang="en-US" sz="2400" dirty="0">
+                <a:latin typeface="Arial" pitchFamily="34" charset="0"/>
+                <a:cs typeface="Arial" pitchFamily="34" charset="0"/>
+              </a:rPr>
+              <a:t>View data </a:t>
+            </a:r>
+            <a:r>
+              <a:rPr lang="en-US" sz="2400" dirty="0" smtClean="0">
+                <a:latin typeface="Arial" pitchFamily="34" charset="0"/>
+                <a:cs typeface="Arial" pitchFamily="34" charset="0"/>
+              </a:rPr>
+              <a:t>filters</a:t>
+            </a:r>
+            <a:r>
+              <a:rPr lang="en-US" sz="2400" dirty="0">
+                <a:latin typeface="Arial" pitchFamily="34" charset="0"/>
+                <a:cs typeface="Arial" pitchFamily="34" charset="0"/>
+              </a:rPr>
+              <a:t>.</a:t>
+            </a:r>
+            <a:endParaRPr lang="en-US" sz="2400" dirty="0" smtClean="0">
+              <a:latin typeface="Arial" pitchFamily="34" charset="0"/>
+              <a:cs typeface="Arial" pitchFamily="34" charset="0"/>
+            </a:endParaRPr>
           </a:p>
         </p:txBody>
       </p:sp>

</xml_diff>